<commit_message>
Added a pdf and some updates in the git powerpoint
</commit_message>
<xml_diff>
--- a/M2/Skill/4-Workflow/PowerPoint/4 workflow.pptx
+++ b/M2/Skill/4-Workflow/PowerPoint/4 workflow.pptx
@@ -3989,6 +3989,30 @@
     </pc:docChg>
   </pc:docChgLst>
   <pc:docChgLst>
+    <pc:chgData name="Gaël Griffith" userId="S::25393@ma-web.nl::6be9e67f-10d8-411a-9f9d-6868b1a89518" providerId="AD" clId="Web-{9770246A-E0B9-462A-B7F5-B1948BF31F61}"/>
+    <pc:docChg chg="modSld">
+      <pc:chgData name="Gaël Griffith" userId="S::25393@ma-web.nl::6be9e67f-10d8-411a-9f9d-6868b1a89518" providerId="AD" clId="Web-{9770246A-E0B9-462A-B7F5-B1948BF31F61}" dt="2020-09-15T11:59:22.850" v="0" actId="1076"/>
+      <pc:docMkLst>
+        <pc:docMk/>
+      </pc:docMkLst>
+      <pc:sldChg chg="modSp">
+        <pc:chgData name="Gaël Griffith" userId="S::25393@ma-web.nl::6be9e67f-10d8-411a-9f9d-6868b1a89518" providerId="AD" clId="Web-{9770246A-E0B9-462A-B7F5-B1948BF31F61}" dt="2020-09-15T11:59:22.850" v="0" actId="1076"/>
+        <pc:sldMkLst>
+          <pc:docMk/>
+          <pc:sldMk cId="0" sldId="256"/>
+        </pc:sldMkLst>
+        <pc:spChg chg="mod">
+          <ac:chgData name="Gaël Griffith" userId="S::25393@ma-web.nl::6be9e67f-10d8-411a-9f9d-6868b1a89518" providerId="AD" clId="Web-{9770246A-E0B9-462A-B7F5-B1948BF31F61}" dt="2020-09-15T11:59:22.850" v="0" actId="1076"/>
+          <ac:spMkLst>
+            <pc:docMk/>
+            <pc:sldMk cId="0" sldId="256"/>
+            <ac:spMk id="54" creationId="{00000000-0000-0000-0000-000000000000}"/>
+          </ac:spMkLst>
+        </pc:spChg>
+      </pc:sldChg>
+    </pc:docChg>
+  </pc:docChgLst>
+  <pc:docChgLst>
     <pc:chgData name="Dragan Javorac" userId="913c2858-fb97-4c6e-a42c-b1f1a16b225e" providerId="ADAL" clId="{5AC97985-0A90-4BAD-81FB-88F74D5EE673}"/>
     <pc:docChg chg="modSld modMainMaster">
       <pc:chgData name="Dragan Javorac" userId="913c2858-fb97-4c6e-a42c-b1f1a16b225e" providerId="ADAL" clId="{5AC97985-0A90-4BAD-81FB-88F74D5EE673}" dt="2022-09-12T12:06:47.423" v="80"/>
@@ -4089,30 +4113,6 @@
           </pc:sldLayoutMkLst>
         </pc:sldLayoutChg>
       </pc:sldMasterChg>
-    </pc:docChg>
-  </pc:docChgLst>
-  <pc:docChgLst>
-    <pc:chgData name="Gaël Griffith" userId="S::25393@ma-web.nl::6be9e67f-10d8-411a-9f9d-6868b1a89518" providerId="AD" clId="Web-{9770246A-E0B9-462A-B7F5-B1948BF31F61}"/>
-    <pc:docChg chg="modSld">
-      <pc:chgData name="Gaël Griffith" userId="S::25393@ma-web.nl::6be9e67f-10d8-411a-9f9d-6868b1a89518" providerId="AD" clId="Web-{9770246A-E0B9-462A-B7F5-B1948BF31F61}" dt="2020-09-15T11:59:22.850" v="0" actId="1076"/>
-      <pc:docMkLst>
-        <pc:docMk/>
-      </pc:docMkLst>
-      <pc:sldChg chg="modSp">
-        <pc:chgData name="Gaël Griffith" userId="S::25393@ma-web.nl::6be9e67f-10d8-411a-9f9d-6868b1a89518" providerId="AD" clId="Web-{9770246A-E0B9-462A-B7F5-B1948BF31F61}" dt="2020-09-15T11:59:22.850" v="0" actId="1076"/>
-        <pc:sldMkLst>
-          <pc:docMk/>
-          <pc:sldMk cId="0" sldId="256"/>
-        </pc:sldMkLst>
-        <pc:spChg chg="mod">
-          <ac:chgData name="Gaël Griffith" userId="S::25393@ma-web.nl::6be9e67f-10d8-411a-9f9d-6868b1a89518" providerId="AD" clId="Web-{9770246A-E0B9-462A-B7F5-B1948BF31F61}" dt="2020-09-15T11:59:22.850" v="0" actId="1076"/>
-          <ac:spMkLst>
-            <pc:docMk/>
-            <pc:sldMk cId="0" sldId="256"/>
-            <ac:spMk id="54" creationId="{00000000-0000-0000-0000-000000000000}"/>
-          </ac:spMkLst>
-        </pc:spChg>
-      </pc:sldChg>
     </pc:docChg>
   </pc:docChgLst>
   <pc:docChgLst>
@@ -4226,6 +4226,22 @@
     </pc:docChg>
   </pc:docChgLst>
   <pc:docChgLst>
+    <pc:chgData name="Bram de Vries" userId="S::32018@ma-web.nl::4a465a1c-bf44-4b44-8c1b-d17b3d3bc55c" providerId="AD" clId="Web-{0653E803-6DA8-159F-A8E1-4BA24DF9782E}"/>
+    <pc:docChg chg="sldOrd">
+      <pc:chgData name="Bram de Vries" userId="S::32018@ma-web.nl::4a465a1c-bf44-4b44-8c1b-d17b3d3bc55c" providerId="AD" clId="Web-{0653E803-6DA8-159F-A8E1-4BA24DF9782E}" dt="2020-09-22T13:10:34.837" v="0"/>
+      <pc:docMkLst>
+        <pc:docMk/>
+      </pc:docMkLst>
+      <pc:sldChg chg="ord">
+        <pc:chgData name="Bram de Vries" userId="S::32018@ma-web.nl::4a465a1c-bf44-4b44-8c1b-d17b3d3bc55c" providerId="AD" clId="Web-{0653E803-6DA8-159F-A8E1-4BA24DF9782E}" dt="2020-09-22T13:10:34.837" v="0"/>
+        <pc:sldMkLst>
+          <pc:docMk/>
+          <pc:sldMk cId="3498386614" sldId="280"/>
+        </pc:sldMkLst>
+      </pc:sldChg>
+    </pc:docChg>
+  </pc:docChgLst>
+  <pc:docChgLst>
     <pc:chgData name="Rick Dohmen" userId="S::30476@ma-web.nl::b09bd7e2-1d9e-4809-8adf-28d02244fbfb" providerId="AD" clId="Web-{CFB8AEF8-2481-44E7-841A-B56EE42CE31E}"/>
     <pc:docChg chg="sldOrd">
       <pc:chgData name="Rick Dohmen" userId="S::30476@ma-web.nl::b09bd7e2-1d9e-4809-8adf-28d02244fbfb" providerId="AD" clId="Web-{CFB8AEF8-2481-44E7-841A-B56EE42CE31E}" dt="2020-09-22T10:03:27.325" v="1"/>
@@ -4237,22 +4253,6 @@
         <pc:sldMkLst>
           <pc:docMk/>
           <pc:sldMk cId="0" sldId="278"/>
-        </pc:sldMkLst>
-      </pc:sldChg>
-    </pc:docChg>
-  </pc:docChgLst>
-  <pc:docChgLst>
-    <pc:chgData name="Bram de Vries" userId="S::32018@ma-web.nl::4a465a1c-bf44-4b44-8c1b-d17b3d3bc55c" providerId="AD" clId="Web-{0653E803-6DA8-159F-A8E1-4BA24DF9782E}"/>
-    <pc:docChg chg="sldOrd">
-      <pc:chgData name="Bram de Vries" userId="S::32018@ma-web.nl::4a465a1c-bf44-4b44-8c1b-d17b3d3bc55c" providerId="AD" clId="Web-{0653E803-6DA8-159F-A8E1-4BA24DF9782E}" dt="2020-09-22T13:10:34.837" v="0"/>
-      <pc:docMkLst>
-        <pc:docMk/>
-      </pc:docMkLst>
-      <pc:sldChg chg="ord">
-        <pc:chgData name="Bram de Vries" userId="S::32018@ma-web.nl::4a465a1c-bf44-4b44-8c1b-d17b3d3bc55c" providerId="AD" clId="Web-{0653E803-6DA8-159F-A8E1-4BA24DF9782E}" dt="2020-09-22T13:10:34.837" v="0"/>
-        <pc:sldMkLst>
-          <pc:docMk/>
-          <pc:sldMk cId="3498386614" sldId="280"/>
         </pc:sldMkLst>
       </pc:sldChg>
     </pc:docChg>
@@ -4351,22 +4351,6 @@
     </pc:docChg>
   </pc:docChgLst>
   <pc:docChgLst>
-    <pc:chgData name="Kilian Rijks" userId="S::30697@ma-web.nl::f8ce6190-20f5-4f44-ad1c-c5dcb23f9695" providerId="AD" clId="Web-{D02C8E39-8AB5-45AA-A943-2F33A4BAEB8E}"/>
-    <pc:docChg chg="sldOrd">
-      <pc:chgData name="Kilian Rijks" userId="S::30697@ma-web.nl::f8ce6190-20f5-4f44-ad1c-c5dcb23f9695" providerId="AD" clId="Web-{D02C8E39-8AB5-45AA-A943-2F33A4BAEB8E}" dt="2020-09-22T12:28:56.255" v="0"/>
-      <pc:docMkLst>
-        <pc:docMk/>
-      </pc:docMkLst>
-      <pc:sldChg chg="ord">
-        <pc:chgData name="Kilian Rijks" userId="S::30697@ma-web.nl::f8ce6190-20f5-4f44-ad1c-c5dcb23f9695" providerId="AD" clId="Web-{D02C8E39-8AB5-45AA-A943-2F33A4BAEB8E}" dt="2020-09-22T12:28:56.255" v="0"/>
-        <pc:sldMkLst>
-          <pc:docMk/>
-          <pc:sldMk cId="3498386614" sldId="280"/>
-        </pc:sldMkLst>
-      </pc:sldChg>
-    </pc:docChg>
-  </pc:docChgLst>
-  <pc:docChgLst>
     <pc:chgData name="Sam Derakhshandeh" userId="S::27741@ma-web.nl::25dbf886-86ce-40a8-a7a4-33199b4fd093" providerId="AD" clId="Web-{A15E7CBA-987D-4FC5-806E-9C0674420E45}"/>
     <pc:docChg chg="modSld">
       <pc:chgData name="Sam Derakhshandeh" userId="S::27741@ma-web.nl::25dbf886-86ce-40a8-a7a4-33199b4fd093" providerId="AD" clId="Web-{A15E7CBA-987D-4FC5-806E-9C0674420E45}" dt="2020-09-22T12:27:39.317" v="0" actId="1076"/>
@@ -4387,6 +4371,22 @@
             <ac:spMk id="211" creationId="{00000000-0000-0000-0000-000000000000}"/>
           </ac:spMkLst>
         </pc:spChg>
+      </pc:sldChg>
+    </pc:docChg>
+  </pc:docChgLst>
+  <pc:docChgLst>
+    <pc:chgData name="Kilian Rijks" userId="S::30697@ma-web.nl::f8ce6190-20f5-4f44-ad1c-c5dcb23f9695" providerId="AD" clId="Web-{D02C8E39-8AB5-45AA-A943-2F33A4BAEB8E}"/>
+    <pc:docChg chg="sldOrd">
+      <pc:chgData name="Kilian Rijks" userId="S::30697@ma-web.nl::f8ce6190-20f5-4f44-ad1c-c5dcb23f9695" providerId="AD" clId="Web-{D02C8E39-8AB5-45AA-A943-2F33A4BAEB8E}" dt="2020-09-22T12:28:56.255" v="0"/>
+      <pc:docMkLst>
+        <pc:docMk/>
+      </pc:docMkLst>
+      <pc:sldChg chg="ord">
+        <pc:chgData name="Kilian Rijks" userId="S::30697@ma-web.nl::f8ce6190-20f5-4f44-ad1c-c5dcb23f9695" providerId="AD" clId="Web-{D02C8E39-8AB5-45AA-A943-2F33A4BAEB8E}" dt="2020-09-22T12:28:56.255" v="0"/>
+        <pc:sldMkLst>
+          <pc:docMk/>
+          <pc:sldMk cId="3498386614" sldId="280"/>
+        </pc:sldMkLst>
       </pc:sldChg>
     </pc:docChg>
   </pc:docChgLst>
@@ -15608,7 +15608,7 @@
               <a:buNone/>
             </a:pPr>
             <a:r>
-              <a:rPr lang="en-US" dirty="0"/>
+              <a:rPr lang="en-US" b="1" dirty="0"/>
               <a:t>Team:</a:t>
             </a:r>
           </a:p>
@@ -15627,31 +15627,7 @@
             </a:r>
             <a:r>
               <a:rPr lang="en-US" dirty="0"/>
-              <a:t> web- of </a:t>
-            </a:r>
-            <a:r>
-              <a:rPr lang="en-US" dirty="0" err="1"/>
-              <a:t>gameteam</a:t>
-            </a:r>
-            <a:r>
-              <a:rPr lang="en-US" dirty="0"/>
-              <a:t> met </a:t>
-            </a:r>
-            <a:r>
-              <a:rPr lang="en-US" dirty="0" err="1"/>
-              <a:t>tussen</a:t>
-            </a:r>
-            <a:r>
-              <a:rPr lang="en-US" dirty="0"/>
-              <a:t> de 2 </a:t>
-            </a:r>
-            <a:r>
-              <a:rPr lang="en-US" dirty="0" err="1"/>
-              <a:t>en</a:t>
-            </a:r>
-            <a:r>
-              <a:rPr lang="en-US" dirty="0"/>
-              <a:t> 5 </a:t>
+              <a:t> team met 2 tot 5 </a:t>
             </a:r>
             <a:r>
               <a:rPr lang="en-US" dirty="0" err="1"/>
@@ -15699,9 +15675,15 @@
               <a:rPr lang="en-US" dirty="0"/>
               <a:t> </a:t>
             </a:r>
+          </a:p>
+          <a:p>
+            <a:pPr marL="482600" indent="-342900">
+              <a:buFont typeface="+mj-lt"/>
+              <a:buAutoNum type="arabicPeriod"/>
+            </a:pPr>
             <a:r>
               <a:rPr lang="en-US" dirty="0" err="1"/>
-              <a:t>en</a:t>
+              <a:t>Bepaal</a:t>
             </a:r>
             <a:r>
               <a:rPr lang="en-US" dirty="0"/>
@@ -15741,11 +15723,11 @@
               <a:buNone/>
             </a:pPr>
             <a:r>
-              <a:rPr lang="en-US" dirty="0" err="1"/>
+              <a:rPr lang="en-US" b="1" dirty="0" err="1"/>
               <a:t>RepoMaster</a:t>
             </a:r>
             <a:r>
-              <a:rPr lang="en-US" dirty="0"/>
+              <a:rPr lang="en-US" b="1" dirty="0"/>
               <a:t>:</a:t>
             </a:r>
           </a:p>
@@ -15755,30 +15737,24 @@
               <a:buAutoNum type="arabicPeriod"/>
             </a:pPr>
             <a:r>
+              <a:rPr lang="nl-NL" dirty="0"/>
+              <a:t>Maak een </a:t>
+            </a:r>
+            <a:r>
               <a:rPr lang="nl-NL" dirty="0" err="1"/>
-              <a:t>RepoMaster</a:t>
+              <a:t>repo</a:t>
             </a:r>
             <a:r>
               <a:rPr lang="nl-NL" dirty="0"/>
-              <a:t> zet een lokale </a:t>
+              <a:t> aan met de </a:t>
             </a:r>
             <a:r>
               <a:rPr lang="nl-NL" dirty="0" err="1"/>
-              <a:t>repository</a:t>
+              <a:t>branch</a:t>
             </a:r>
             <a:r>
               <a:rPr lang="nl-NL" dirty="0"/>
-              <a:t> op</a:t>
-            </a:r>
-          </a:p>
-          <a:p>
-            <a:pPr>
-              <a:buFont typeface="+mj-lt"/>
-              <a:buAutoNum type="arabicPeriod"/>
-            </a:pPr>
-            <a:r>
-              <a:rPr lang="nl-NL" dirty="0"/>
-              <a:t>Start de branche </a:t>
+              <a:t> </a:t>
             </a:r>
             <a:r>
               <a:rPr lang="nl-NL" b="1" dirty="0" err="1">
@@ -15792,15 +15768,43 @@
             </a:r>
             <a:r>
               <a:rPr lang="nl-NL" dirty="0"/>
-              <a:t> en </a:t>
+              <a:t> </a:t>
+            </a:r>
+          </a:p>
+          <a:p>
+            <a:pPr>
+              <a:buFont typeface="+mj-lt"/>
+              <a:buAutoNum type="arabicPeriod"/>
+            </a:pPr>
+            <a:r>
+              <a:rPr lang="nl-NL" dirty="0"/>
+              <a:t>In de </a:t>
             </a:r>
             <a:r>
               <a:rPr lang="nl-NL" dirty="0" err="1"/>
-              <a:t>commit</a:t>
+              <a:t>readme.md</a:t>
             </a:r>
             <a:r>
               <a:rPr lang="nl-NL" dirty="0"/>
-              <a:t> daarheen een README.md (met als inhoud de namen van de teamleden)</a:t>
+              <a:t> plaats je de teamleden</a:t>
+            </a:r>
+          </a:p>
+          <a:p>
+            <a:pPr>
+              <a:buFont typeface="+mj-lt"/>
+              <a:buAutoNum type="arabicPeriod"/>
+            </a:pPr>
+            <a:r>
+              <a:rPr lang="nl-NL" dirty="0"/>
+              <a:t>Plaats het minimarket project en push dit naar de </a:t>
+            </a:r>
+            <a:r>
+              <a:rPr lang="nl-NL" dirty="0" err="1"/>
+              <a:t>main</a:t>
+            </a:r>
+            <a:r>
+              <a:rPr lang="nl-NL" dirty="0"/>
+              <a:t>.</a:t>
             </a:r>
           </a:p>
           <a:p>
@@ -15832,7 +15836,7 @@
             </a:r>
             <a:r>
               <a:rPr lang="nl-NL" dirty="0"/>
-              <a:t> Ze daar de bestanden neer waar je mee wil beginnen</a:t>
+              <a:t> </a:t>
             </a:r>
           </a:p>
           <a:p>
@@ -15842,11 +15846,11 @@
             </a:pPr>
             <a:r>
               <a:rPr lang="nl-NL" dirty="0"/>
-              <a:t>Stuur de </a:t>
-            </a:r>
-            <a:r>
-              <a:rPr lang="nl-NL" dirty="0" err="1"/>
-              <a:t>repo</a:t>
+              <a:t>Stuur deze </a:t>
+            </a:r>
+            <a:r>
+              <a:rPr lang="en-US" dirty="0"/>
+              <a:t>Repo</a:t>
             </a:r>
             <a:r>
               <a:rPr lang="nl-NL" dirty="0"/>
@@ -15914,7 +15918,7 @@
             </a:pPr>
             <a:r>
               <a:rPr lang="en-US" dirty="0"/>
-              <a:t>Clone de remote REPO</a:t>
+              <a:t>Clone de remote Repo</a:t>
             </a:r>
           </a:p>
           <a:p>
@@ -15993,11 +15997,55 @@
             </a:r>
             <a:r>
               <a:rPr lang="en-US" dirty="0"/>
-              <a:t> van het </a:t>
-            </a:r>
+              <a:t> van het project</a:t>
+            </a:r>
+          </a:p>
+          <a:p>
+            <a:pPr marL="482600" indent="-342900">
+              <a:buFont typeface="+mj-lt"/>
+              <a:buAutoNum type="arabicPeriod"/>
+            </a:pPr>
             <a:r>
               <a:rPr lang="en-US" dirty="0" err="1"/>
-              <a:t>teamprobject</a:t>
+              <a:t>Gebruik</a:t>
+            </a:r>
+            <a:r>
+              <a:rPr lang="en-US" dirty="0"/>
+              <a:t> </a:t>
+            </a:r>
+            <a:r>
+              <a:rPr lang="en-US" dirty="0" err="1"/>
+              <a:t>hetzelfde</a:t>
+            </a:r>
+            <a:r>
+              <a:rPr lang="en-US" dirty="0"/>
+              <a:t> project !</a:t>
+            </a:r>
+          </a:p>
+          <a:p>
+            <a:pPr marL="482600" indent="-342900">
+              <a:buFont typeface="+mj-lt"/>
+              <a:buAutoNum type="arabicPeriod"/>
+            </a:pPr>
+            <a:r>
+              <a:rPr lang="en-US" dirty="0" err="1"/>
+              <a:t>Gebruik</a:t>
+            </a:r>
+            <a:r>
+              <a:rPr lang="en-US" dirty="0"/>
+              <a:t> </a:t>
+            </a:r>
+            <a:r>
+              <a:rPr lang="en-US" dirty="0" err="1"/>
+              <a:t>dezelfde</a:t>
+            </a:r>
+            <a:r>
+              <a:rPr lang="en-US" dirty="0"/>
+              <a:t> Unity </a:t>
+            </a:r>
+            <a:r>
+              <a:rPr lang="en-US" dirty="0" err="1"/>
+              <a:t>versie</a:t>
             </a:r>
             <a:endParaRPr lang="en-US" dirty="0"/>
           </a:p>
@@ -16043,12 +16091,11 @@
             <a:endParaRPr lang="en-US" dirty="0"/>
           </a:p>
           <a:p>
-            <a:pPr marL="482600" indent="-342900">
-              <a:buFont typeface="+mj-lt"/>
-              <a:buAutoNum type="arabicPeriod"/>
+            <a:pPr marL="139700" indent="0">
+              <a:buNone/>
             </a:pPr>
             <a:r>
-              <a:rPr lang="en-US" dirty="0"/>
+              <a:rPr lang="en-US" b="1" dirty="0"/>
               <a:t>Team:</a:t>
             </a:r>
           </a:p>
@@ -16090,12 +16137,6 @@
               </a:rPr>
               <a:t>development</a:t>
             </a:r>
-          </a:p>
-          <a:p>
-            <a:pPr marL="482600" indent="-342900">
-              <a:buFont typeface="+mj-lt"/>
-              <a:buAutoNum type="arabicPeriod"/>
-            </a:pPr>
             <a:endParaRPr lang="en-US" dirty="0"/>
           </a:p>
           <a:p>
@@ -16117,17 +16158,15 @@
               </a:rPr>
               <a:t>main</a:t>
             </a:r>
+          </a:p>
+          <a:p>
+            <a:pPr marL="482600" indent="-342900">
+              <a:buFont typeface="+mj-lt"/>
+              <a:buAutoNum type="arabicPeriod"/>
+            </a:pPr>
             <a:r>
               <a:rPr lang="en-US" dirty="0"/>
-              <a:t> </a:t>
-            </a:r>
-            <a:r>
-              <a:rPr lang="en-US" dirty="0" err="1"/>
-              <a:t>en</a:t>
-            </a:r>
-            <a:r>
-              <a:rPr lang="en-US" dirty="0"/>
-              <a:t> lever de URL in </a:t>
+              <a:t>Lever de URL in </a:t>
             </a:r>
             <a:r>
               <a:rPr lang="en-US" dirty="0" err="1"/>
@@ -19536,6 +19575,12 @@
 </file>
 
 <file path=customXml/item2.xml><?xml version="1.0" encoding="utf-8"?>
+<p:properties xmlns:p="http://schemas.microsoft.com/office/2006/metadata/properties" xmlns:xsi="http://www.w3.org/2001/XMLSchema-instance" xmlns:pc="http://schemas.microsoft.com/office/infopath/2007/PartnerControls">
+  <documentManagement/>
+</p:properties>
+</file>
+
+<file path=customXml/item3.xml><?xml version="1.0" encoding="utf-8"?>
 <ct:contentTypeSchema xmlns:ct="http://schemas.microsoft.com/office/2006/metadata/contentType" xmlns:ma="http://schemas.microsoft.com/office/2006/metadata/properties/metaAttributes" ct:_="" ma:_="" ma:contentTypeName="Document" ma:contentTypeID="0x010100D9EB5C2D39876A418216A0F9CA870C99" ma:contentTypeVersion="3" ma:contentTypeDescription="Create a new document." ma:contentTypeScope="" ma:versionID="9aecdf3227e93a22c50a6003e71ffe48">
   <xsd:schema xmlns:xsd="http://www.w3.org/2001/XMLSchema" xmlns:xs="http://www.w3.org/2001/XMLSchema" xmlns:p="http://schemas.microsoft.com/office/2006/metadata/properties" xmlns:ns2="e1e829e0-e72c-4cab-be3a-c790bcef4396" targetNamespace="http://schemas.microsoft.com/office/2006/metadata/properties" ma:root="true" ma:fieldsID="035e5376d1ef08e353b667fec7617c5d" ns2:_="">
     <xsd:import namespace="e1e829e0-e72c-4cab-be3a-c790bcef4396"/>
@@ -19673,12 +19718,6 @@
 </ct:contentTypeSchema>
 </file>
 
-<file path=customXml/item3.xml><?xml version="1.0" encoding="utf-8"?>
-<p:properties xmlns:p="http://schemas.microsoft.com/office/2006/metadata/properties" xmlns:xsi="http://www.w3.org/2001/XMLSchema-instance" xmlns:pc="http://schemas.microsoft.com/office/infopath/2007/PartnerControls">
-  <documentManagement/>
-</p:properties>
-</file>
-
 <file path=customXml/itemProps1.xml><?xml version="1.0" encoding="utf-8"?>
 <ds:datastoreItem xmlns:ds="http://schemas.openxmlformats.org/officeDocument/2006/customXml" ds:itemID="{4077D397-A58D-41CD-9DDC-45F29C08B187}">
   <ds:schemaRefs>
@@ -19688,6 +19727,22 @@
 </file>
 
 <file path=customXml/itemProps2.xml><?xml version="1.0" encoding="utf-8"?>
+<ds:datastoreItem xmlns:ds="http://schemas.openxmlformats.org/officeDocument/2006/customXml" ds:itemID="{72B6DE8D-9C4F-42E6-BF5C-BF8BF3BCA2F6}">
+  <ds:schemaRefs>
+    <ds:schemaRef ds:uri="http://purl.org/dc/elements/1.1/"/>
+    <ds:schemaRef ds:uri="885d402c-76b9-4792-92a1-2b62a1d56104"/>
+    <ds:schemaRef ds:uri="http://schemas.microsoft.com/office/2006/documentManagement/types"/>
+    <ds:schemaRef ds:uri="http://schemas.microsoft.com/office/2006/metadata/properties"/>
+    <ds:schemaRef ds:uri="http://schemas.microsoft.com/office/infopath/2007/PartnerControls"/>
+    <ds:schemaRef ds:uri="http://purl.org/dc/dcmitype/"/>
+    <ds:schemaRef ds:uri="http://schemas.openxmlformats.org/package/2006/metadata/core-properties"/>
+    <ds:schemaRef ds:uri="http://www.w3.org/XML/1998/namespace"/>
+    <ds:schemaRef ds:uri="http://purl.org/dc/terms/"/>
+  </ds:schemaRefs>
+</ds:datastoreItem>
+</file>
+
+<file path=customXml/itemProps3.xml><?xml version="1.0" encoding="utf-8"?>
 <ds:datastoreItem xmlns:ds="http://schemas.openxmlformats.org/officeDocument/2006/customXml" ds:itemID="{8DE7AF41-ED24-46A8-BC23-9459067AA847}">
   <ds:schemaRefs>
     <ds:schemaRef ds:uri="http://schemas.microsoft.com/office/2006/metadata/contentType"/>
@@ -19703,20 +19758,4 @@
     <ds:schemaRef ds:uri="http://schemas.microsoft.com/internal/obd"/>
   </ds:schemaRefs>
 </ds:datastoreItem>
-</file>
-
-<file path=customXml/itemProps3.xml><?xml version="1.0" encoding="utf-8"?>
-<ds:datastoreItem xmlns:ds="http://schemas.openxmlformats.org/officeDocument/2006/customXml" ds:itemID="{72B6DE8D-9C4F-42E6-BF5C-BF8BF3BCA2F6}">
-  <ds:schemaRefs>
-    <ds:schemaRef ds:uri="http://purl.org/dc/elements/1.1/"/>
-    <ds:schemaRef ds:uri="885d402c-76b9-4792-92a1-2b62a1d56104"/>
-    <ds:schemaRef ds:uri="http://schemas.microsoft.com/office/2006/documentManagement/types"/>
-    <ds:schemaRef ds:uri="http://schemas.microsoft.com/office/2006/metadata/properties"/>
-    <ds:schemaRef ds:uri="http://schemas.microsoft.com/office/infopath/2007/PartnerControls"/>
-    <ds:schemaRef ds:uri="http://purl.org/dc/dcmitype/"/>
-    <ds:schemaRef ds:uri="http://schemas.openxmlformats.org/package/2006/metadata/core-properties"/>
-    <ds:schemaRef ds:uri="http://www.w3.org/XML/1998/namespace"/>
-    <ds:schemaRef ds:uri="http://purl.org/dc/terms/"/>
-  </ds:schemaRefs>
-</ds:datastoreItem>
 </file>
</xml_diff>

<commit_message>
Tekst update in lessen git - workflow
</commit_message>
<xml_diff>
--- a/M2/Skill/4-Workflow/PowerPoint/4 workflow.pptx
+++ b/M2/Skill/4-Workflow/PowerPoint/4 workflow.pptx
@@ -15928,8 +15928,19 @@
             </a:pPr>
             <a:r>
               <a:rPr lang="en-US" dirty="0"/>
-              <a:t>Checkout de branch development</a:t>
-            </a:r>
+              <a:t>Checkout de branch </a:t>
+            </a:r>
+            <a:r>
+              <a:rPr lang="nl-NL" b="1" dirty="0">
+                <a:solidFill>
+                  <a:srgbClr val="FFFF00"/>
+                </a:solidFill>
+                <a:latin typeface="Courier New" panose="02070309020205020404" pitchFamily="49" charset="0"/>
+                <a:cs typeface="Courier New" panose="02070309020205020404" pitchFamily="49" charset="0"/>
+              </a:rPr>
+              <a:t>development</a:t>
+            </a:r>
+            <a:endParaRPr lang="en-US" dirty="0"/>
           </a:p>
           <a:p>
             <a:pPr marL="482600" indent="-342900">

</xml_diff>